<commit_message>
Shark Attacks Project: completed
</commit_message>
<xml_diff>
--- a/Surfing_Shark_Attacks_Insights.pptx
+++ b/Surfing_Shark_Attacks_Insights.pptx
@@ -3248,7 +3248,7 @@
       </p:sp>
       <p:pic>
         <p:nvPicPr>
-          <p:cNvPr id="5" name="Content Placeholder 4" descr="fatal_pie.png"/>
+          <p:cNvPr id="4" name="Content Placeholder 3"/>
           <p:cNvPicPr>
             <a:picLocks noGrp="1" noChangeAspect="1"/>
           </p:cNvPicPr>
@@ -3264,8 +3264,32 @@
         </p:blipFill>
         <p:spPr>
           <a:xfrm>
-            <a:off x="2309018" y="1600200"/>
-            <a:ext cx="4525963" cy="4525963"/>
+            <a:off x="1097280" y="1600201"/>
+            <a:ext cx="3149883" cy="2801532"/>
+          </a:xfrm>
+          <a:prstGeom prst="rect">
+            <a:avLst/>
+          </a:prstGeom>
+        </p:spPr>
+      </p:pic>
+      <p:pic>
+        <p:nvPicPr>
+          <p:cNvPr id="6" name="Picture 5"/>
+          <p:cNvPicPr>
+            <a:picLocks noChangeAspect="1"/>
+          </p:cNvPicPr>
+          <p:nvPr/>
+        </p:nvPicPr>
+        <p:blipFill>
+          <a:blip r:embed="rId3"/>
+          <a:stretch>
+            <a:fillRect/>
+          </a:stretch>
+        </p:blipFill>
+        <p:spPr>
+          <a:xfrm>
+            <a:off x="4521550" y="3382721"/>
+            <a:ext cx="3046062" cy="2794241"/>
           </a:xfrm>
           <a:prstGeom prst="rect">
             <a:avLst/>
@@ -3333,14 +3357,19 @@
           <a:bodyPr/>
           <a:lstStyle/>
           <a:p>
-            <a:endParaRPr/>
+            <a:endParaRPr dirty="0"/>
           </a:p>
           <a:p>
             <a:pPr>
               <a:defRPr sz="2200"/>
             </a:pPr>
             <a:r>
-              <a:t>• Non-standard/inconsistent entries (sex, age, fatality).</a:t>
+              <a:rPr dirty="0" smtClean="0"/>
+              <a:t>Non-standard/inconsistent </a:t>
+            </a:r>
+            <a:r>
+              <a:rPr dirty="0"/>
+              <a:t>entries (sex, age, fatality).</a:t>
             </a:r>
           </a:p>
           <a:p>
@@ -3348,7 +3377,12 @@
               <a:defRPr sz="2200"/>
             </a:pPr>
             <a:r>
-              <a:t>• Resolution: Custom cleaning functions, regex, mapping.</a:t>
+              <a:rPr dirty="0" smtClean="0"/>
+              <a:t>Resolution</a:t>
+            </a:r>
+            <a:r>
+              <a:rPr dirty="0"/>
+              <a:t>: Custom cleaning functions, regex, mapping.</a:t>
             </a:r>
           </a:p>
           <a:p>
@@ -3356,7 +3390,12 @@
               <a:defRPr sz="2200"/>
             </a:pPr>
             <a:r>
-              <a:t>• Lesson: Data cleaning is most time-consuming and critical.</a:t>
+              <a:rPr dirty="0" smtClean="0"/>
+              <a:t>Lesson</a:t>
+            </a:r>
+            <a:r>
+              <a:rPr dirty="0"/>
+              <a:t>: Data cleaning is most time-consuming and critical.</a:t>
             </a:r>
           </a:p>
         </p:txBody>
@@ -3422,14 +3461,19 @@
           <a:bodyPr/>
           <a:lstStyle/>
           <a:p>
-            <a:endParaRPr/>
+            <a:endParaRPr dirty="0"/>
           </a:p>
           <a:p>
             <a:pPr>
               <a:defRPr sz="2200"/>
             </a:pPr>
             <a:r>
-              <a:t>• USA (esp. Florida, California, Hawaii) is highest risk market.</a:t>
+              <a:rPr dirty="0" smtClean="0"/>
+              <a:t>USA </a:t>
+            </a:r>
+            <a:r>
+              <a:rPr dirty="0"/>
+              <a:t>(esp. Florida, California, Hawaii) is highest risk market.</a:t>
             </a:r>
           </a:p>
           <a:p>
@@ -3437,7 +3481,12 @@
               <a:defRPr sz="2200"/>
             </a:pPr>
             <a:r>
-              <a:t>• Most attacks are non-fatal; pricing can be location/season-specific.</a:t>
+              <a:rPr dirty="0" smtClean="0"/>
+              <a:t>Most </a:t>
+            </a:r>
+            <a:r>
+              <a:rPr dirty="0"/>
+              <a:t>attacks are non-fatal; pricing can be location/season-specific.</a:t>
             </a:r>
           </a:p>
           <a:p>
@@ -3445,7 +3494,12 @@
               <a:defRPr sz="2200"/>
             </a:pPr>
             <a:r>
-              <a:t>• Young males are most frequent victims.</a:t>
+              <a:rPr dirty="0" smtClean="0"/>
+              <a:t>Young </a:t>
+            </a:r>
+            <a:r>
+              <a:rPr dirty="0"/>
+              <a:t>males are most frequent victims.</a:t>
             </a:r>
           </a:p>
           <a:p>
@@ -3453,7 +3507,12 @@
               <a:defRPr sz="2200"/>
             </a:pPr>
             <a:r>
-              <a:t>• Specific beaches (New Smyrna Beach, FL) are high risk.</a:t>
+              <a:rPr dirty="0" smtClean="0"/>
+              <a:t>Specific </a:t>
+            </a:r>
+            <a:r>
+              <a:rPr dirty="0"/>
+              <a:t>beaches (New Smyrna Beach, FL) are high risk.</a:t>
             </a:r>
           </a:p>
           <a:p>
@@ -3461,7 +3520,12 @@
               <a:defRPr sz="2200"/>
             </a:pPr>
             <a:r>
-              <a:t>• Despite media focus, non-fatal injuries dominate.</a:t>
+              <a:rPr dirty="0" smtClean="0"/>
+              <a:t>Despite </a:t>
+            </a:r>
+            <a:r>
+              <a:rPr dirty="0"/>
+              <a:t>media focus, non-fatal injuries dominate.</a:t>
             </a:r>
           </a:p>
         </p:txBody>
@@ -3527,14 +3591,19 @@
           <a:bodyPr/>
           <a:lstStyle/>
           <a:p>
-            <a:endParaRPr/>
+            <a:endParaRPr dirty="0"/>
           </a:p>
           <a:p>
             <a:pPr>
               <a:defRPr sz="2200"/>
             </a:pPr>
             <a:r>
-              <a:t>• Insurance: Risk-based pricing &amp; targeted marketing are feasible.</a:t>
+              <a:rPr dirty="0" smtClean="0"/>
+              <a:t>Insurance</a:t>
+            </a:r>
+            <a:r>
+              <a:rPr dirty="0"/>
+              <a:t>: Risk-based pricing &amp; targeted marketing are feasible.</a:t>
             </a:r>
           </a:p>
           <a:p>
@@ -3542,7 +3611,12 @@
               <a:defRPr sz="2200"/>
             </a:pPr>
             <a:r>
-              <a:t>• Business: Focus on young male surfers in high-risk states/beaches.</a:t>
+              <a:rPr dirty="0" smtClean="0"/>
+              <a:t>Business</a:t>
+            </a:r>
+            <a:r>
+              <a:rPr dirty="0"/>
+              <a:t>: Focus on young male surfers in high-risk states/beaches.</a:t>
             </a:r>
           </a:p>
           <a:p>
@@ -3550,7 +3624,12 @@
               <a:defRPr sz="2200"/>
             </a:pPr>
             <a:r>
-              <a:t>• Public Policy: Local interventions at high-risk beaches matter.</a:t>
+              <a:rPr dirty="0" smtClean="0"/>
+              <a:t>Public </a:t>
+            </a:r>
+            <a:r>
+              <a:rPr dirty="0"/>
+              <a:t>Policy: Local interventions at high-risk beaches matter.</a:t>
             </a:r>
           </a:p>
         </p:txBody>
@@ -4149,14 +4228,24 @@
           <a:lstStyle/>
           <a:p>
             <a:r>
-              <a:t>Top Beaches for Surfing Shark Attacks</a:t>
-            </a:r>
+              <a:rPr dirty="0" smtClean="0"/>
+              <a:t>Top Beaches for Surfing </a:t>
+            </a:r>
+            <a:r>
+              <a:rPr dirty="0"/>
+              <a:t>Shark </a:t>
+            </a:r>
+            <a:r>
+              <a:rPr dirty="0" smtClean="0"/>
+              <a:t>Attacks</a:t>
+            </a:r>
+            <a:endParaRPr dirty="0"/>
           </a:p>
         </p:txBody>
       </p:sp>
       <p:pic>
         <p:nvPicPr>
-          <p:cNvPr id="5" name="Content Placeholder 4" descr="top_beaches.png"/>
+          <p:cNvPr id="9" name="Content Placeholder 8"/>
           <p:cNvPicPr>
             <a:picLocks noGrp="1" noChangeAspect="1"/>
           </p:cNvPicPr>
@@ -4172,8 +4261,8 @@
         </p:blipFill>
         <p:spPr>
           <a:xfrm>
-            <a:off x="457200" y="1805781"/>
-            <a:ext cx="8229600" cy="4114800"/>
+            <a:off x="3372540" y="1600200"/>
+            <a:ext cx="2398920" cy="4525963"/>
           </a:xfrm>
           <a:prstGeom prst="rect">
             <a:avLst/>
@@ -4221,14 +4310,16 @@
           <a:lstStyle/>
           <a:p>
             <a:r>
-              <a:t>Victim Sex Distribution</a:t>
-            </a:r>
+              <a:rPr lang="en-GB" dirty="0" smtClean="0"/>
+              <a:t>Surfing Shark Attacks Last 10 Years </a:t>
+            </a:r>
+            <a:endParaRPr dirty="0"/>
           </a:p>
         </p:txBody>
       </p:sp>
       <p:pic>
         <p:nvPicPr>
-          <p:cNvPr id="5" name="Content Placeholder 4" descr="sex_dist.png"/>
+          <p:cNvPr id="4" name="Content Placeholder 3"/>
           <p:cNvPicPr>
             <a:picLocks noGrp="1" noChangeAspect="1"/>
           </p:cNvPicPr>
@@ -4244,8 +4335,8 @@
         </p:blipFill>
         <p:spPr>
           <a:xfrm>
-            <a:off x="1403826" y="1600200"/>
-            <a:ext cx="6336348" cy="4525963"/>
+            <a:off x="731327" y="1600200"/>
+            <a:ext cx="7681345" cy="4525963"/>
           </a:xfrm>
           <a:prstGeom prst="rect">
             <a:avLst/>
@@ -4300,7 +4391,7 @@
       </p:sp>
       <p:pic>
         <p:nvPicPr>
-          <p:cNvPr id="5" name="Content Placeholder 4" descr="age_dist.png"/>
+          <p:cNvPr id="4" name="Content Placeholder 3"/>
           <p:cNvPicPr>
             <a:picLocks noGrp="1" noChangeAspect="1"/>
           </p:cNvPicPr>
@@ -4316,8 +4407,8 @@
         </p:blipFill>
         <p:spPr>
           <a:xfrm>
-            <a:off x="951229" y="1600200"/>
-            <a:ext cx="7241541" cy="4525963"/>
+            <a:off x="457200" y="1672028"/>
+            <a:ext cx="8229600" cy="4382307"/>
           </a:xfrm>
           <a:prstGeom prst="rect">
             <a:avLst/>

</xml_diff>